<commit_message>
new page for snowflake
</commit_message>
<xml_diff>
--- a/doc/snowflake.pptx
+++ b/doc/snowflake.pptx
@@ -6,12 +6,13 @@
   </p:sldMasterIdLst>
   <p:sldIdLst>
     <p:sldId id="256" r:id="rId2"/>
-    <p:sldId id="257" r:id="rId3"/>
-    <p:sldId id="258" r:id="rId4"/>
-    <p:sldId id="259" r:id="rId5"/>
-    <p:sldId id="260" r:id="rId6"/>
-    <p:sldId id="261" r:id="rId7"/>
-    <p:sldId id="262" r:id="rId8"/>
+    <p:sldId id="263" r:id="rId3"/>
+    <p:sldId id="257" r:id="rId4"/>
+    <p:sldId id="258" r:id="rId5"/>
+    <p:sldId id="259" r:id="rId6"/>
+    <p:sldId id="260" r:id="rId7"/>
+    <p:sldId id="261" r:id="rId8"/>
+    <p:sldId id="262" r:id="rId9"/>
   </p:sldIdLst>
   <p:sldSz cx="12192000" cy="6858000"/>
   <p:notesSz cx="6858000" cy="9144000"/>
@@ -265,7 +266,7 @@
           <a:p>
             <a:fld id="{EDBD463F-00B9-497F-8BDB-F8240C88174D}" type="datetimeFigureOut">
               <a:rPr lang="zh-CN" altLang="en-US" smtClean="0"/>
-              <a:t>2023/1/26</a:t>
+              <a:t>2023/1/27</a:t>
             </a:fld>
             <a:endParaRPr lang="zh-CN" altLang="en-US"/>
           </a:p>
@@ -463,7 +464,7 @@
           <a:p>
             <a:fld id="{EDBD463F-00B9-497F-8BDB-F8240C88174D}" type="datetimeFigureOut">
               <a:rPr lang="zh-CN" altLang="en-US" smtClean="0"/>
-              <a:t>2023/1/26</a:t>
+              <a:t>2023/1/27</a:t>
             </a:fld>
             <a:endParaRPr lang="zh-CN" altLang="en-US"/>
           </a:p>
@@ -671,7 +672,7 @@
           <a:p>
             <a:fld id="{EDBD463F-00B9-497F-8BDB-F8240C88174D}" type="datetimeFigureOut">
               <a:rPr lang="zh-CN" altLang="en-US" smtClean="0"/>
-              <a:t>2023/1/26</a:t>
+              <a:t>2023/1/27</a:t>
             </a:fld>
             <a:endParaRPr lang="zh-CN" altLang="en-US"/>
           </a:p>
@@ -869,7 +870,7 @@
           <a:p>
             <a:fld id="{EDBD463F-00B9-497F-8BDB-F8240C88174D}" type="datetimeFigureOut">
               <a:rPr lang="zh-CN" altLang="en-US" smtClean="0"/>
-              <a:t>2023/1/26</a:t>
+              <a:t>2023/1/27</a:t>
             </a:fld>
             <a:endParaRPr lang="zh-CN" altLang="en-US"/>
           </a:p>
@@ -1144,7 +1145,7 @@
           <a:p>
             <a:fld id="{EDBD463F-00B9-497F-8BDB-F8240C88174D}" type="datetimeFigureOut">
               <a:rPr lang="zh-CN" altLang="en-US" smtClean="0"/>
-              <a:t>2023/1/26</a:t>
+              <a:t>2023/1/27</a:t>
             </a:fld>
             <a:endParaRPr lang="zh-CN" altLang="en-US"/>
           </a:p>
@@ -1409,7 +1410,7 @@
           <a:p>
             <a:fld id="{EDBD463F-00B9-497F-8BDB-F8240C88174D}" type="datetimeFigureOut">
               <a:rPr lang="zh-CN" altLang="en-US" smtClean="0"/>
-              <a:t>2023/1/26</a:t>
+              <a:t>2023/1/27</a:t>
             </a:fld>
             <a:endParaRPr lang="zh-CN" altLang="en-US"/>
           </a:p>
@@ -1821,7 +1822,7 @@
           <a:p>
             <a:fld id="{EDBD463F-00B9-497F-8BDB-F8240C88174D}" type="datetimeFigureOut">
               <a:rPr lang="zh-CN" altLang="en-US" smtClean="0"/>
-              <a:t>2023/1/26</a:t>
+              <a:t>2023/1/27</a:t>
             </a:fld>
             <a:endParaRPr lang="zh-CN" altLang="en-US"/>
           </a:p>
@@ -1962,7 +1963,7 @@
           <a:p>
             <a:fld id="{EDBD463F-00B9-497F-8BDB-F8240C88174D}" type="datetimeFigureOut">
               <a:rPr lang="zh-CN" altLang="en-US" smtClean="0"/>
-              <a:t>2023/1/26</a:t>
+              <a:t>2023/1/27</a:t>
             </a:fld>
             <a:endParaRPr lang="zh-CN" altLang="en-US"/>
           </a:p>
@@ -2075,7 +2076,7 @@
           <a:p>
             <a:fld id="{EDBD463F-00B9-497F-8BDB-F8240C88174D}" type="datetimeFigureOut">
               <a:rPr lang="zh-CN" altLang="en-US" smtClean="0"/>
-              <a:t>2023/1/26</a:t>
+              <a:t>2023/1/27</a:t>
             </a:fld>
             <a:endParaRPr lang="zh-CN" altLang="en-US"/>
           </a:p>
@@ -2386,7 +2387,7 @@
           <a:p>
             <a:fld id="{EDBD463F-00B9-497F-8BDB-F8240C88174D}" type="datetimeFigureOut">
               <a:rPr lang="zh-CN" altLang="en-US" smtClean="0"/>
-              <a:t>2023/1/26</a:t>
+              <a:t>2023/1/27</a:t>
             </a:fld>
             <a:endParaRPr lang="zh-CN" altLang="en-US"/>
           </a:p>
@@ -2674,7 +2675,7 @@
           <a:p>
             <a:fld id="{EDBD463F-00B9-497F-8BDB-F8240C88174D}" type="datetimeFigureOut">
               <a:rPr lang="zh-CN" altLang="en-US" smtClean="0"/>
-              <a:t>2023/1/26</a:t>
+              <a:t>2023/1/27</a:t>
             </a:fld>
             <a:endParaRPr lang="zh-CN" altLang="en-US"/>
           </a:p>
@@ -2915,7 +2916,7 @@
           <a:p>
             <a:fld id="{EDBD463F-00B9-497F-8BDB-F8240C88174D}" type="datetimeFigureOut">
               <a:rPr lang="zh-CN" altLang="en-US" smtClean="0"/>
-              <a:t>2023/1/26</a:t>
+              <a:t>2023/1/27</a:t>
             </a:fld>
             <a:endParaRPr lang="zh-CN" altLang="en-US"/>
           </a:p>
@@ -3552,6 +3553,112 @@
       </p:grpSpPr>
       <p:sp>
         <p:nvSpPr>
+          <p:cNvPr id="2" name="文本框 1">
+            <a:extLst>
+              <a:ext uri="{FF2B5EF4-FFF2-40B4-BE49-F238E27FC236}">
+                <a16:creationId xmlns:a16="http://schemas.microsoft.com/office/drawing/2014/main" id="{7F0AA5E2-A3A1-7E01-DEA7-5809DACEEBC5}"/>
+              </a:ext>
+            </a:extLst>
+          </p:cNvPr>
+          <p:cNvSpPr txBox="1"/>
+          <p:nvPr/>
+        </p:nvSpPr>
+        <p:spPr>
+          <a:xfrm>
+            <a:off x="683491" y="715880"/>
+            <a:ext cx="6096000" cy="369332"/>
+          </a:xfrm>
+          <a:prstGeom prst="rect">
+            <a:avLst/>
+          </a:prstGeom>
+          <a:noFill/>
+        </p:spPr>
+        <p:txBody>
+          <a:bodyPr wrap="square">
+            <a:spAutoFit/>
+          </a:bodyPr>
+          <a:lstStyle/>
+          <a:p>
+            <a:pPr algn="l"/>
+            <a:r>
+              <a:rPr lang="en-US" altLang="zh-CN" b="1" i="0" dirty="0">
+                <a:solidFill>
+                  <a:srgbClr val="0F0F0F"/>
+                </a:solidFill>
+                <a:effectLst/>
+                <a:latin typeface="微软雅黑" panose="020B0503020204020204" pitchFamily="34" charset="-122"/>
+                <a:ea typeface="微软雅黑" panose="020B0503020204020204" pitchFamily="34" charset="-122"/>
+              </a:rPr>
+              <a:t>Snowflake</a:t>
+            </a:r>
+            <a:r>
+              <a:rPr lang="zh-CN" altLang="en-US" b="1" i="0" dirty="0">
+                <a:solidFill>
+                  <a:srgbClr val="0F0F0F"/>
+                </a:solidFill>
+                <a:effectLst/>
+                <a:latin typeface="微软雅黑" panose="020B0503020204020204" pitchFamily="34" charset="-122"/>
+                <a:ea typeface="微软雅黑" panose="020B0503020204020204" pitchFamily="34" charset="-122"/>
+              </a:rPr>
+              <a:t>公司分析 </a:t>
+            </a:r>
+            <a:r>
+              <a:rPr lang="en-US" altLang="zh-CN" b="1" i="0" dirty="0">
+                <a:solidFill>
+                  <a:srgbClr val="0F0F0F"/>
+                </a:solidFill>
+                <a:effectLst/>
+                <a:latin typeface="微软雅黑" panose="020B0503020204020204" pitchFamily="34" charset="-122"/>
+                <a:ea typeface="微软雅黑" panose="020B0503020204020204" pitchFamily="34" charset="-122"/>
+              </a:rPr>
+              <a:t>| SNOW</a:t>
+            </a:r>
+            <a:r>
+              <a:rPr lang="zh-CN" altLang="en-US" b="1" i="0" dirty="0">
+                <a:solidFill>
+                  <a:srgbClr val="0F0F0F"/>
+                </a:solidFill>
+                <a:effectLst/>
+                <a:latin typeface="微软雅黑" panose="020B0503020204020204" pitchFamily="34" charset="-122"/>
+                <a:ea typeface="微软雅黑" panose="020B0503020204020204" pitchFamily="34" charset="-122"/>
+              </a:rPr>
+              <a:t>一家颠覆云数据库的公司</a:t>
+            </a:r>
+          </a:p>
+        </p:txBody>
+      </p:sp>
+    </p:spTree>
+    <p:extLst>
+      <p:ext uri="{BB962C8B-B14F-4D97-AF65-F5344CB8AC3E}">
+        <p14:creationId xmlns:p14="http://schemas.microsoft.com/office/powerpoint/2010/main" val="2065645747"/>
+      </p:ext>
+    </p:extLst>
+  </p:cSld>
+  <p:clrMapOvr>
+    <a:masterClrMapping/>
+  </p:clrMapOvr>
+</p:sld>
+</file>
+
+<file path=ppt/slides/slide3.xml><?xml version="1.0" encoding="utf-8"?>
+<p:sld xmlns:a="http://schemas.openxmlformats.org/drawingml/2006/main" xmlns:r="http://schemas.openxmlformats.org/officeDocument/2006/relationships" xmlns:p="http://schemas.openxmlformats.org/presentationml/2006/main">
+  <p:cSld>
+    <p:spTree>
+      <p:nvGrpSpPr>
+        <p:cNvPr id="1" name=""/>
+        <p:cNvGrpSpPr/>
+        <p:nvPr/>
+      </p:nvGrpSpPr>
+      <p:grpSpPr>
+        <a:xfrm>
+          <a:off x="0" y="0"/>
+          <a:ext cx="0" cy="0"/>
+          <a:chOff x="0" y="0"/>
+          <a:chExt cx="0" cy="0"/>
+        </a:xfrm>
+      </p:grpSpPr>
+      <p:sp>
+        <p:nvSpPr>
           <p:cNvPr id="6" name="文本框 5">
             <a:extLst>
               <a:ext uri="{FF2B5EF4-FFF2-40B4-BE49-F238E27FC236}">
@@ -3686,7 +3793,7 @@
 </p:sld>
 </file>
 
-<file path=ppt/slides/slide3.xml><?xml version="1.0" encoding="utf-8"?>
+<file path=ppt/slides/slide4.xml><?xml version="1.0" encoding="utf-8"?>
 <p:sld xmlns:a="http://schemas.openxmlformats.org/drawingml/2006/main" xmlns:r="http://schemas.openxmlformats.org/officeDocument/2006/relationships" xmlns:p="http://schemas.openxmlformats.org/presentationml/2006/main">
   <p:cSld>
     <p:spTree>
@@ -3836,7 +3943,7 @@
 </p:sld>
 </file>
 
-<file path=ppt/slides/slide4.xml><?xml version="1.0" encoding="utf-8"?>
+<file path=ppt/slides/slide5.xml><?xml version="1.0" encoding="utf-8"?>
 <p:sld xmlns:a="http://schemas.openxmlformats.org/drawingml/2006/main" xmlns:r="http://schemas.openxmlformats.org/officeDocument/2006/relationships" xmlns:p="http://schemas.openxmlformats.org/presentationml/2006/main">
   <p:cSld>
     <p:spTree>
@@ -3996,7 +4103,7 @@
 </p:sld>
 </file>
 
-<file path=ppt/slides/slide5.xml><?xml version="1.0" encoding="utf-8"?>
+<file path=ppt/slides/slide6.xml><?xml version="1.0" encoding="utf-8"?>
 <p:sld xmlns:a="http://schemas.openxmlformats.org/drawingml/2006/main" xmlns:r="http://schemas.openxmlformats.org/officeDocument/2006/relationships" xmlns:p="http://schemas.openxmlformats.org/presentationml/2006/main">
   <p:cSld>
     <p:spTree>
@@ -4056,7 +4163,7 @@
 </p:sld>
 </file>
 
-<file path=ppt/slides/slide6.xml><?xml version="1.0" encoding="utf-8"?>
+<file path=ppt/slides/slide7.xml><?xml version="1.0" encoding="utf-8"?>
 <p:sld xmlns:a="http://schemas.openxmlformats.org/drawingml/2006/main" xmlns:r="http://schemas.openxmlformats.org/officeDocument/2006/relationships" xmlns:p="http://schemas.openxmlformats.org/presentationml/2006/main">
   <p:cSld>
     <p:spTree>
@@ -4116,7 +4223,7 @@
 </p:sld>
 </file>
 
-<file path=ppt/slides/slide7.xml><?xml version="1.0" encoding="utf-8"?>
+<file path=ppt/slides/slide8.xml><?xml version="1.0" encoding="utf-8"?>
 <p:sld xmlns:a="http://schemas.openxmlformats.org/drawingml/2006/main" xmlns:r="http://schemas.openxmlformats.org/officeDocument/2006/relationships" xmlns:p="http://schemas.openxmlformats.org/presentationml/2006/main">
   <p:cSld>
     <p:spTree>

</xml_diff>